<commit_message>
effect update and could make thunder bubble
</commit_message>
<xml_diff>
--- a/2013180003 김나단 3차발표 ppt.pptx
+++ b/2013180003 김나단 3차발표 ppt.pptx
@@ -214,7 +214,7 @@
           <a:p>
             <a:fld id="{C258B557-FAA3-4236-B06C-C70543935B15}" type="datetimeFigureOut">
               <a:rPr lang="ko-KR" altLang="en-US" smtClean="0"/>
-              <a:t>2016-11-03</a:t>
+              <a:t>2016-11-06</a:t>
             </a:fld>
             <a:endParaRPr lang="ko-KR" altLang="en-US"/>
           </a:p>
@@ -610,7 +610,7 @@
           <a:p>
             <a:fld id="{0285A1AB-BFE4-4D4D-ADBE-154CFD289A72}" type="datetimeFigureOut">
               <a:rPr lang="ko-KR" altLang="en-US" smtClean="0"/>
-              <a:t>2016-11-03</a:t>
+              <a:t>2016-11-06</a:t>
             </a:fld>
             <a:endParaRPr lang="ko-KR" altLang="en-US"/>
           </a:p>
@@ -778,7 +778,7 @@
           <a:p>
             <a:fld id="{0285A1AB-BFE4-4D4D-ADBE-154CFD289A72}" type="datetimeFigureOut">
               <a:rPr lang="ko-KR" altLang="en-US" smtClean="0"/>
-              <a:t>2016-11-03</a:t>
+              <a:t>2016-11-06</a:t>
             </a:fld>
             <a:endParaRPr lang="ko-KR" altLang="en-US"/>
           </a:p>
@@ -956,7 +956,7 @@
           <a:p>
             <a:fld id="{0285A1AB-BFE4-4D4D-ADBE-154CFD289A72}" type="datetimeFigureOut">
               <a:rPr lang="ko-KR" altLang="en-US" smtClean="0"/>
-              <a:t>2016-11-03</a:t>
+              <a:t>2016-11-06</a:t>
             </a:fld>
             <a:endParaRPr lang="ko-KR" altLang="en-US"/>
           </a:p>
@@ -1124,7 +1124,7 @@
           <a:p>
             <a:fld id="{0285A1AB-BFE4-4D4D-ADBE-154CFD289A72}" type="datetimeFigureOut">
               <a:rPr lang="ko-KR" altLang="en-US" smtClean="0"/>
-              <a:t>2016-11-03</a:t>
+              <a:t>2016-11-06</a:t>
             </a:fld>
             <a:endParaRPr lang="ko-KR" altLang="en-US"/>
           </a:p>
@@ -1369,7 +1369,7 @@
           <a:p>
             <a:fld id="{0285A1AB-BFE4-4D4D-ADBE-154CFD289A72}" type="datetimeFigureOut">
               <a:rPr lang="ko-KR" altLang="en-US" smtClean="0"/>
-              <a:t>2016-11-03</a:t>
+              <a:t>2016-11-06</a:t>
             </a:fld>
             <a:endParaRPr lang="ko-KR" altLang="en-US"/>
           </a:p>
@@ -1598,7 +1598,7 @@
           <a:p>
             <a:fld id="{0285A1AB-BFE4-4D4D-ADBE-154CFD289A72}" type="datetimeFigureOut">
               <a:rPr lang="ko-KR" altLang="en-US" smtClean="0"/>
-              <a:t>2016-11-03</a:t>
+              <a:t>2016-11-06</a:t>
             </a:fld>
             <a:endParaRPr lang="ko-KR" altLang="en-US"/>
           </a:p>
@@ -1962,7 +1962,7 @@
           <a:p>
             <a:fld id="{0285A1AB-BFE4-4D4D-ADBE-154CFD289A72}" type="datetimeFigureOut">
               <a:rPr lang="ko-KR" altLang="en-US" smtClean="0"/>
-              <a:t>2016-11-03</a:t>
+              <a:t>2016-11-06</a:t>
             </a:fld>
             <a:endParaRPr lang="ko-KR" altLang="en-US"/>
           </a:p>
@@ -2079,7 +2079,7 @@
           <a:p>
             <a:fld id="{0285A1AB-BFE4-4D4D-ADBE-154CFD289A72}" type="datetimeFigureOut">
               <a:rPr lang="ko-KR" altLang="en-US" smtClean="0"/>
-              <a:t>2016-11-03</a:t>
+              <a:t>2016-11-06</a:t>
             </a:fld>
             <a:endParaRPr lang="ko-KR" altLang="en-US"/>
           </a:p>
@@ -2174,7 +2174,7 @@
           <a:p>
             <a:fld id="{0285A1AB-BFE4-4D4D-ADBE-154CFD289A72}" type="datetimeFigureOut">
               <a:rPr lang="ko-KR" altLang="en-US" smtClean="0"/>
-              <a:t>2016-11-03</a:t>
+              <a:t>2016-11-06</a:t>
             </a:fld>
             <a:endParaRPr lang="ko-KR" altLang="en-US"/>
           </a:p>
@@ -2449,7 +2449,7 @@
           <a:p>
             <a:fld id="{0285A1AB-BFE4-4D4D-ADBE-154CFD289A72}" type="datetimeFigureOut">
               <a:rPr lang="ko-KR" altLang="en-US" smtClean="0"/>
-              <a:t>2016-11-03</a:t>
+              <a:t>2016-11-06</a:t>
             </a:fld>
             <a:endParaRPr lang="ko-KR" altLang="en-US"/>
           </a:p>
@@ -2701,7 +2701,7 @@
           <a:p>
             <a:fld id="{0285A1AB-BFE4-4D4D-ADBE-154CFD289A72}" type="datetimeFigureOut">
               <a:rPr lang="ko-KR" altLang="en-US" smtClean="0"/>
-              <a:t>2016-11-03</a:t>
+              <a:t>2016-11-06</a:t>
             </a:fld>
             <a:endParaRPr lang="ko-KR" altLang="en-US"/>
           </a:p>
@@ -2912,7 +2912,7 @@
           <a:p>
             <a:fld id="{0285A1AB-BFE4-4D4D-ADBE-154CFD289A72}" type="datetimeFigureOut">
               <a:rPr lang="ko-KR" altLang="en-US" smtClean="0"/>
-              <a:t>2016-11-03</a:t>
+              <a:t>2016-11-06</a:t>
             </a:fld>
             <a:endParaRPr lang="ko-KR" altLang="en-US"/>
           </a:p>
@@ -4329,7 +4329,7 @@
             <p:ph idx="1"/>
             <p:extLst>
               <p:ext uri="{D42A27DB-BD31-4B8C-83A1-F6EECF244321}">
-                <p14:modId xmlns:p14="http://schemas.microsoft.com/office/powerpoint/2010/main" val="4245373131"/>
+                <p14:modId xmlns:p14="http://schemas.microsoft.com/office/powerpoint/2010/main" val="2576424669"/>
               </p:ext>
             </p:extLst>
           </p:nvPr>
@@ -4998,6 +4998,16 @@
                         <a:rPr lang="ko-KR" altLang="en-US" sz="1050" baseline="0" dirty="0"/>
                         <a:t>완료</a:t>
                       </a:r>
+                      <a:endParaRPr lang="en-US" altLang="ko-KR" sz="1050" baseline="0" dirty="0"/>
+                    </a:p>
+                    <a:p>
+                      <a:pPr marL="228600" indent="-228600" latinLnBrk="1">
+                        <a:buAutoNum type="arabicPeriod"/>
+                      </a:pPr>
+                      <a:r>
+                        <a:rPr lang="ko-KR" altLang="en-US" sz="1050" baseline="0" dirty="0"/>
+                        <a:t>보스 패턴 구현 완료</a:t>
+                      </a:r>
                       <a:endParaRPr lang="ko-KR" altLang="en-US" sz="1050" dirty="0"/>
                     </a:p>
                   </a:txBody>
@@ -5394,7 +5404,7 @@
         </p:nvSpPr>
         <p:spPr>
           <a:xfrm>
-            <a:off x="167981" y="2781945"/>
+            <a:off x="149128" y="3441822"/>
             <a:ext cx="863600" cy="863600"/>
           </a:xfrm>
           <a:prstGeom prst="rightArrow">

</xml_diff>

<commit_message>
get a little bug
</commit_message>
<xml_diff>
--- a/2013180003 김나단 3차발표 ppt.pptx
+++ b/2013180003 김나단 3차발표 ppt.pptx
@@ -214,7 +214,7 @@
           <a:p>
             <a:fld id="{C258B557-FAA3-4236-B06C-C70543935B15}" type="datetimeFigureOut">
               <a:rPr lang="ko-KR" altLang="en-US" smtClean="0"/>
-              <a:t>2016-11-06</a:t>
+              <a:t>2016-11-11</a:t>
             </a:fld>
             <a:endParaRPr lang="ko-KR" altLang="en-US"/>
           </a:p>
@@ -610,7 +610,7 @@
           <a:p>
             <a:fld id="{0285A1AB-BFE4-4D4D-ADBE-154CFD289A72}" type="datetimeFigureOut">
               <a:rPr lang="ko-KR" altLang="en-US" smtClean="0"/>
-              <a:t>2016-11-06</a:t>
+              <a:t>2016-11-11</a:t>
             </a:fld>
             <a:endParaRPr lang="ko-KR" altLang="en-US"/>
           </a:p>
@@ -778,7 +778,7 @@
           <a:p>
             <a:fld id="{0285A1AB-BFE4-4D4D-ADBE-154CFD289A72}" type="datetimeFigureOut">
               <a:rPr lang="ko-KR" altLang="en-US" smtClean="0"/>
-              <a:t>2016-11-06</a:t>
+              <a:t>2016-11-11</a:t>
             </a:fld>
             <a:endParaRPr lang="ko-KR" altLang="en-US"/>
           </a:p>
@@ -956,7 +956,7 @@
           <a:p>
             <a:fld id="{0285A1AB-BFE4-4D4D-ADBE-154CFD289A72}" type="datetimeFigureOut">
               <a:rPr lang="ko-KR" altLang="en-US" smtClean="0"/>
-              <a:t>2016-11-06</a:t>
+              <a:t>2016-11-11</a:t>
             </a:fld>
             <a:endParaRPr lang="ko-KR" altLang="en-US"/>
           </a:p>
@@ -1124,7 +1124,7 @@
           <a:p>
             <a:fld id="{0285A1AB-BFE4-4D4D-ADBE-154CFD289A72}" type="datetimeFigureOut">
               <a:rPr lang="ko-KR" altLang="en-US" smtClean="0"/>
-              <a:t>2016-11-06</a:t>
+              <a:t>2016-11-11</a:t>
             </a:fld>
             <a:endParaRPr lang="ko-KR" altLang="en-US"/>
           </a:p>
@@ -1369,7 +1369,7 @@
           <a:p>
             <a:fld id="{0285A1AB-BFE4-4D4D-ADBE-154CFD289A72}" type="datetimeFigureOut">
               <a:rPr lang="ko-KR" altLang="en-US" smtClean="0"/>
-              <a:t>2016-11-06</a:t>
+              <a:t>2016-11-11</a:t>
             </a:fld>
             <a:endParaRPr lang="ko-KR" altLang="en-US"/>
           </a:p>
@@ -1598,7 +1598,7 @@
           <a:p>
             <a:fld id="{0285A1AB-BFE4-4D4D-ADBE-154CFD289A72}" type="datetimeFigureOut">
               <a:rPr lang="ko-KR" altLang="en-US" smtClean="0"/>
-              <a:t>2016-11-06</a:t>
+              <a:t>2016-11-11</a:t>
             </a:fld>
             <a:endParaRPr lang="ko-KR" altLang="en-US"/>
           </a:p>
@@ -1962,7 +1962,7 @@
           <a:p>
             <a:fld id="{0285A1AB-BFE4-4D4D-ADBE-154CFD289A72}" type="datetimeFigureOut">
               <a:rPr lang="ko-KR" altLang="en-US" smtClean="0"/>
-              <a:t>2016-11-06</a:t>
+              <a:t>2016-11-11</a:t>
             </a:fld>
             <a:endParaRPr lang="ko-KR" altLang="en-US"/>
           </a:p>
@@ -2079,7 +2079,7 @@
           <a:p>
             <a:fld id="{0285A1AB-BFE4-4D4D-ADBE-154CFD289A72}" type="datetimeFigureOut">
               <a:rPr lang="ko-KR" altLang="en-US" smtClean="0"/>
-              <a:t>2016-11-06</a:t>
+              <a:t>2016-11-11</a:t>
             </a:fld>
             <a:endParaRPr lang="ko-KR" altLang="en-US"/>
           </a:p>
@@ -2174,7 +2174,7 @@
           <a:p>
             <a:fld id="{0285A1AB-BFE4-4D4D-ADBE-154CFD289A72}" type="datetimeFigureOut">
               <a:rPr lang="ko-KR" altLang="en-US" smtClean="0"/>
-              <a:t>2016-11-06</a:t>
+              <a:t>2016-11-11</a:t>
             </a:fld>
             <a:endParaRPr lang="ko-KR" altLang="en-US"/>
           </a:p>
@@ -2449,7 +2449,7 @@
           <a:p>
             <a:fld id="{0285A1AB-BFE4-4D4D-ADBE-154CFD289A72}" type="datetimeFigureOut">
               <a:rPr lang="ko-KR" altLang="en-US" smtClean="0"/>
-              <a:t>2016-11-06</a:t>
+              <a:t>2016-11-11</a:t>
             </a:fld>
             <a:endParaRPr lang="ko-KR" altLang="en-US"/>
           </a:p>
@@ -2701,7 +2701,7 @@
           <a:p>
             <a:fld id="{0285A1AB-BFE4-4D4D-ADBE-154CFD289A72}" type="datetimeFigureOut">
               <a:rPr lang="ko-KR" altLang="en-US" smtClean="0"/>
-              <a:t>2016-11-06</a:t>
+              <a:t>2016-11-11</a:t>
             </a:fld>
             <a:endParaRPr lang="ko-KR" altLang="en-US"/>
           </a:p>
@@ -2912,7 +2912,7 @@
           <a:p>
             <a:fld id="{0285A1AB-BFE4-4D4D-ADBE-154CFD289A72}" type="datetimeFigureOut">
               <a:rPr lang="ko-KR" altLang="en-US" smtClean="0"/>
-              <a:t>2016-11-06</a:t>
+              <a:t>2016-11-11</a:t>
             </a:fld>
             <a:endParaRPr lang="ko-KR" altLang="en-US"/>
           </a:p>
@@ -4329,7 +4329,7 @@
             <p:ph idx="1"/>
             <p:extLst>
               <p:ext uri="{D42A27DB-BD31-4B8C-83A1-F6EECF244321}">
-                <p14:modId xmlns:p14="http://schemas.microsoft.com/office/powerpoint/2010/main" val="2576424669"/>
+                <p14:modId xmlns:p14="http://schemas.microsoft.com/office/powerpoint/2010/main" val="2105794936"/>
               </p:ext>
             </p:extLst>
           </p:nvPr>
@@ -4886,25 +4886,8 @@
                       </a:pPr>
                       <a:r>
                         <a:rPr lang="ko-KR" altLang="en-US" sz="1050" dirty="0"/>
-                        <a:t>대 보스</a:t>
-                      </a:r>
-                      <a:r>
-                        <a:rPr lang="ko-KR" altLang="en-US" sz="1050" baseline="0" dirty="0"/>
-                        <a:t> 전용 아이템 미 구현</a:t>
-                      </a:r>
-                      <a:r>
-                        <a:rPr lang="en-US" altLang="ko-KR" sz="1050" baseline="0" dirty="0"/>
-                        <a:t>(</a:t>
-                      </a:r>
-                      <a:r>
-                        <a:rPr lang="ko-KR" altLang="en-US" sz="1050" baseline="0" dirty="0"/>
-                        <a:t>진행중</a:t>
-                      </a:r>
-                      <a:r>
-                        <a:rPr lang="en-US" altLang="ko-KR" sz="1050" baseline="0" dirty="0"/>
-                        <a:t>)</a:t>
-                      </a:r>
-                      <a:endParaRPr lang="ko-KR" altLang="en-US" sz="1050" dirty="0"/>
+                        <a:t>대 보스 용 아이템 구현 완료</a:t>
+                      </a:r>
                     </a:p>
                   </a:txBody>
                   <a:tcPr/>
@@ -5091,7 +5074,18 @@
                       <a:pPr marL="228600" indent="-228600" latinLnBrk="1">
                         <a:buAutoNum type="arabicPeriod"/>
                       </a:pPr>
-                      <a:endParaRPr lang="ko-KR" altLang="en-US" sz="1050" dirty="0"/>
+                      <a:r>
+                        <a:rPr lang="ko-KR" altLang="en-US" sz="1050" dirty="0"/>
+                        <a:t>사운드 추가 </a:t>
+                      </a:r>
+                      <a:r>
+                        <a:rPr lang="en-US" altLang="ko-KR" sz="1050" dirty="0"/>
+                        <a:t>100%</a:t>
+                      </a:r>
+                      <a:r>
+                        <a:rPr lang="ko-KR" altLang="en-US" sz="1050" dirty="0"/>
+                        <a:t>완료</a:t>
+                      </a:r>
                     </a:p>
                   </a:txBody>
                   <a:tcPr/>
@@ -5404,7 +5398,7 @@
         </p:nvSpPr>
         <p:spPr>
           <a:xfrm>
-            <a:off x="149128" y="3441822"/>
+            <a:off x="139701" y="4063991"/>
             <a:ext cx="863600" cy="863600"/>
           </a:xfrm>
           <a:prstGeom prst="rightArrow">

</xml_diff>

<commit_message>
add object that make bubble under stage
</commit_message>
<xml_diff>
--- a/2013180003 김나단 3차발표 ppt.pptx
+++ b/2013180003 김나단 3차발표 ppt.pptx
@@ -214,7 +214,7 @@
           <a:p>
             <a:fld id="{C258B557-FAA3-4236-B06C-C70543935B15}" type="datetimeFigureOut">
               <a:rPr lang="ko-KR" altLang="en-US" smtClean="0"/>
-              <a:t>2016-11-11</a:t>
+              <a:t>2016-11-15</a:t>
             </a:fld>
             <a:endParaRPr lang="ko-KR" altLang="en-US"/>
           </a:p>
@@ -610,7 +610,7 @@
           <a:p>
             <a:fld id="{0285A1AB-BFE4-4D4D-ADBE-154CFD289A72}" type="datetimeFigureOut">
               <a:rPr lang="ko-KR" altLang="en-US" smtClean="0"/>
-              <a:t>2016-11-11</a:t>
+              <a:t>2016-11-15</a:t>
             </a:fld>
             <a:endParaRPr lang="ko-KR" altLang="en-US"/>
           </a:p>
@@ -778,7 +778,7 @@
           <a:p>
             <a:fld id="{0285A1AB-BFE4-4D4D-ADBE-154CFD289A72}" type="datetimeFigureOut">
               <a:rPr lang="ko-KR" altLang="en-US" smtClean="0"/>
-              <a:t>2016-11-11</a:t>
+              <a:t>2016-11-15</a:t>
             </a:fld>
             <a:endParaRPr lang="ko-KR" altLang="en-US"/>
           </a:p>
@@ -956,7 +956,7 @@
           <a:p>
             <a:fld id="{0285A1AB-BFE4-4D4D-ADBE-154CFD289A72}" type="datetimeFigureOut">
               <a:rPr lang="ko-KR" altLang="en-US" smtClean="0"/>
-              <a:t>2016-11-11</a:t>
+              <a:t>2016-11-15</a:t>
             </a:fld>
             <a:endParaRPr lang="ko-KR" altLang="en-US"/>
           </a:p>
@@ -1124,7 +1124,7 @@
           <a:p>
             <a:fld id="{0285A1AB-BFE4-4D4D-ADBE-154CFD289A72}" type="datetimeFigureOut">
               <a:rPr lang="ko-KR" altLang="en-US" smtClean="0"/>
-              <a:t>2016-11-11</a:t>
+              <a:t>2016-11-15</a:t>
             </a:fld>
             <a:endParaRPr lang="ko-KR" altLang="en-US"/>
           </a:p>
@@ -1369,7 +1369,7 @@
           <a:p>
             <a:fld id="{0285A1AB-BFE4-4D4D-ADBE-154CFD289A72}" type="datetimeFigureOut">
               <a:rPr lang="ko-KR" altLang="en-US" smtClean="0"/>
-              <a:t>2016-11-11</a:t>
+              <a:t>2016-11-15</a:t>
             </a:fld>
             <a:endParaRPr lang="ko-KR" altLang="en-US"/>
           </a:p>
@@ -1598,7 +1598,7 @@
           <a:p>
             <a:fld id="{0285A1AB-BFE4-4D4D-ADBE-154CFD289A72}" type="datetimeFigureOut">
               <a:rPr lang="ko-KR" altLang="en-US" smtClean="0"/>
-              <a:t>2016-11-11</a:t>
+              <a:t>2016-11-15</a:t>
             </a:fld>
             <a:endParaRPr lang="ko-KR" altLang="en-US"/>
           </a:p>
@@ -1962,7 +1962,7 @@
           <a:p>
             <a:fld id="{0285A1AB-BFE4-4D4D-ADBE-154CFD289A72}" type="datetimeFigureOut">
               <a:rPr lang="ko-KR" altLang="en-US" smtClean="0"/>
-              <a:t>2016-11-11</a:t>
+              <a:t>2016-11-15</a:t>
             </a:fld>
             <a:endParaRPr lang="ko-KR" altLang="en-US"/>
           </a:p>
@@ -2079,7 +2079,7 @@
           <a:p>
             <a:fld id="{0285A1AB-BFE4-4D4D-ADBE-154CFD289A72}" type="datetimeFigureOut">
               <a:rPr lang="ko-KR" altLang="en-US" smtClean="0"/>
-              <a:t>2016-11-11</a:t>
+              <a:t>2016-11-15</a:t>
             </a:fld>
             <a:endParaRPr lang="ko-KR" altLang="en-US"/>
           </a:p>
@@ -2174,7 +2174,7 @@
           <a:p>
             <a:fld id="{0285A1AB-BFE4-4D4D-ADBE-154CFD289A72}" type="datetimeFigureOut">
               <a:rPr lang="ko-KR" altLang="en-US" smtClean="0"/>
-              <a:t>2016-11-11</a:t>
+              <a:t>2016-11-15</a:t>
             </a:fld>
             <a:endParaRPr lang="ko-KR" altLang="en-US"/>
           </a:p>
@@ -2449,7 +2449,7 @@
           <a:p>
             <a:fld id="{0285A1AB-BFE4-4D4D-ADBE-154CFD289A72}" type="datetimeFigureOut">
               <a:rPr lang="ko-KR" altLang="en-US" smtClean="0"/>
-              <a:t>2016-11-11</a:t>
+              <a:t>2016-11-15</a:t>
             </a:fld>
             <a:endParaRPr lang="ko-KR" altLang="en-US"/>
           </a:p>
@@ -2701,7 +2701,7 @@
           <a:p>
             <a:fld id="{0285A1AB-BFE4-4D4D-ADBE-154CFD289A72}" type="datetimeFigureOut">
               <a:rPr lang="ko-KR" altLang="en-US" smtClean="0"/>
-              <a:t>2016-11-11</a:t>
+              <a:t>2016-11-15</a:t>
             </a:fld>
             <a:endParaRPr lang="ko-KR" altLang="en-US"/>
           </a:p>
@@ -2912,7 +2912,7 @@
           <a:p>
             <a:fld id="{0285A1AB-BFE4-4D4D-ADBE-154CFD289A72}" type="datetimeFigureOut">
               <a:rPr lang="ko-KR" altLang="en-US" smtClean="0"/>
-              <a:t>2016-11-11</a:t>
+              <a:t>2016-11-15</a:t>
             </a:fld>
             <a:endParaRPr lang="ko-KR" altLang="en-US"/>
           </a:p>
@@ -4329,7 +4329,7 @@
             <p:ph idx="1"/>
             <p:extLst>
               <p:ext uri="{D42A27DB-BD31-4B8C-83A1-F6EECF244321}">
-                <p14:modId xmlns:p14="http://schemas.microsoft.com/office/powerpoint/2010/main" val="2105794936"/>
+                <p14:modId xmlns:p14="http://schemas.microsoft.com/office/powerpoint/2010/main" val="4020916971"/>
               </p:ext>
             </p:extLst>
           </p:nvPr>
@@ -5086,6 +5086,28 @@
                         <a:rPr lang="ko-KR" altLang="en-US" sz="1050" dirty="0"/>
                         <a:t>완료</a:t>
                       </a:r>
+                      <a:endParaRPr lang="en-US" altLang="ko-KR" sz="1050" dirty="0"/>
+                    </a:p>
+                    <a:p>
+                      <a:pPr marL="228600" indent="-228600" latinLnBrk="1">
+                        <a:buAutoNum type="arabicPeriod"/>
+                      </a:pPr>
+                      <a:r>
+                        <a:rPr lang="ko-KR" altLang="en-US" sz="1050" dirty="0"/>
+                        <a:t>방해 몬스터 추가 완료</a:t>
+                      </a:r>
+                      <a:r>
+                        <a:rPr lang="en-US" altLang="ko-KR" sz="1050" dirty="0"/>
+                        <a:t>,  </a:t>
+                      </a:r>
+                      <a:r>
+                        <a:rPr lang="ko-KR" altLang="en-US" sz="1050"/>
+                        <a:t>방울 생성 </a:t>
+                      </a:r>
+                      <a:r>
+                        <a:rPr lang="ko-KR" altLang="en-US" sz="1050" dirty="0"/>
+                        <a:t>오브젝트 제작 필</a:t>
+                      </a:r>
                     </a:p>
                   </a:txBody>
                   <a:tcPr/>
@@ -5170,6 +5192,10 @@
                       <a:pPr marL="228600" indent="-228600" latinLnBrk="1">
                         <a:buAutoNum type="arabicPeriod"/>
                       </a:pPr>
+                      <a:r>
+                        <a:rPr lang="ko-KR" altLang="en-US" sz="1050" dirty="0"/>
+                        <a:t>적용 완료</a:t>
+                      </a:r>
                       <a:endParaRPr lang="en-US" altLang="ko-KR" sz="1050" dirty="0"/>
                     </a:p>
                   </a:txBody>
@@ -5280,7 +5306,20 @@
                       <a:pPr marL="228600" indent="-228600" latinLnBrk="1">
                         <a:buAutoNum type="arabicPeriod"/>
                       </a:pPr>
-                      <a:endParaRPr lang="ko-KR" altLang="en-US" sz="1050" dirty="0"/>
+                      <a:r>
+                        <a:rPr lang="ko-KR" altLang="en-US" sz="1050" dirty="0"/>
+                        <a:t>점수 합산 화면 추가 완료</a:t>
+                      </a:r>
+                      <a:endParaRPr lang="en-US" altLang="ko-KR" sz="1050" dirty="0"/>
+                    </a:p>
+                    <a:p>
+                      <a:pPr marL="228600" indent="-228600" latinLnBrk="1">
+                        <a:buAutoNum type="arabicPeriod"/>
+                      </a:pPr>
+                      <a:r>
+                        <a:rPr lang="ko-KR" altLang="en-US" sz="1050" dirty="0"/>
+                        <a:t>애니메이션 구상</a:t>
+                      </a:r>
                     </a:p>
                   </a:txBody>
                   <a:tcPr/>
@@ -5398,7 +5437,7 @@
         </p:nvSpPr>
         <p:spPr>
           <a:xfrm>
-            <a:off x="139701" y="4063991"/>
+            <a:off x="139701" y="4629598"/>
             <a:ext cx="863600" cy="863600"/>
           </a:xfrm>
           <a:prstGeom prst="rightArrow">

</xml_diff>

<commit_message>
debug that cheat key work right and add key for go to boss stage
</commit_message>
<xml_diff>
--- a/2013180003 김나단 3차발표 ppt.pptx
+++ b/2013180003 김나단 3차발표 ppt.pptx
@@ -214,7 +214,7 @@
           <a:p>
             <a:fld id="{C258B557-FAA3-4236-B06C-C70543935B15}" type="datetimeFigureOut">
               <a:rPr lang="ko-KR" altLang="en-US" smtClean="0"/>
-              <a:t>2016-11-15</a:t>
+              <a:t>2016-12-15</a:t>
             </a:fld>
             <a:endParaRPr lang="ko-KR" altLang="en-US"/>
           </a:p>
@@ -610,7 +610,7 @@
           <a:p>
             <a:fld id="{0285A1AB-BFE4-4D4D-ADBE-154CFD289A72}" type="datetimeFigureOut">
               <a:rPr lang="ko-KR" altLang="en-US" smtClean="0"/>
-              <a:t>2016-11-15</a:t>
+              <a:t>2016-12-15</a:t>
             </a:fld>
             <a:endParaRPr lang="ko-KR" altLang="en-US"/>
           </a:p>
@@ -778,7 +778,7 @@
           <a:p>
             <a:fld id="{0285A1AB-BFE4-4D4D-ADBE-154CFD289A72}" type="datetimeFigureOut">
               <a:rPr lang="ko-KR" altLang="en-US" smtClean="0"/>
-              <a:t>2016-11-15</a:t>
+              <a:t>2016-12-15</a:t>
             </a:fld>
             <a:endParaRPr lang="ko-KR" altLang="en-US"/>
           </a:p>
@@ -956,7 +956,7 @@
           <a:p>
             <a:fld id="{0285A1AB-BFE4-4D4D-ADBE-154CFD289A72}" type="datetimeFigureOut">
               <a:rPr lang="ko-KR" altLang="en-US" smtClean="0"/>
-              <a:t>2016-11-15</a:t>
+              <a:t>2016-12-15</a:t>
             </a:fld>
             <a:endParaRPr lang="ko-KR" altLang="en-US"/>
           </a:p>
@@ -1124,7 +1124,7 @@
           <a:p>
             <a:fld id="{0285A1AB-BFE4-4D4D-ADBE-154CFD289A72}" type="datetimeFigureOut">
               <a:rPr lang="ko-KR" altLang="en-US" smtClean="0"/>
-              <a:t>2016-11-15</a:t>
+              <a:t>2016-12-15</a:t>
             </a:fld>
             <a:endParaRPr lang="ko-KR" altLang="en-US"/>
           </a:p>
@@ -1369,7 +1369,7 @@
           <a:p>
             <a:fld id="{0285A1AB-BFE4-4D4D-ADBE-154CFD289A72}" type="datetimeFigureOut">
               <a:rPr lang="ko-KR" altLang="en-US" smtClean="0"/>
-              <a:t>2016-11-15</a:t>
+              <a:t>2016-12-15</a:t>
             </a:fld>
             <a:endParaRPr lang="ko-KR" altLang="en-US"/>
           </a:p>
@@ -1598,7 +1598,7 @@
           <a:p>
             <a:fld id="{0285A1AB-BFE4-4D4D-ADBE-154CFD289A72}" type="datetimeFigureOut">
               <a:rPr lang="ko-KR" altLang="en-US" smtClean="0"/>
-              <a:t>2016-11-15</a:t>
+              <a:t>2016-12-15</a:t>
             </a:fld>
             <a:endParaRPr lang="ko-KR" altLang="en-US"/>
           </a:p>
@@ -1962,7 +1962,7 @@
           <a:p>
             <a:fld id="{0285A1AB-BFE4-4D4D-ADBE-154CFD289A72}" type="datetimeFigureOut">
               <a:rPr lang="ko-KR" altLang="en-US" smtClean="0"/>
-              <a:t>2016-11-15</a:t>
+              <a:t>2016-12-15</a:t>
             </a:fld>
             <a:endParaRPr lang="ko-KR" altLang="en-US"/>
           </a:p>
@@ -2079,7 +2079,7 @@
           <a:p>
             <a:fld id="{0285A1AB-BFE4-4D4D-ADBE-154CFD289A72}" type="datetimeFigureOut">
               <a:rPr lang="ko-KR" altLang="en-US" smtClean="0"/>
-              <a:t>2016-11-15</a:t>
+              <a:t>2016-12-15</a:t>
             </a:fld>
             <a:endParaRPr lang="ko-KR" altLang="en-US"/>
           </a:p>
@@ -2174,7 +2174,7 @@
           <a:p>
             <a:fld id="{0285A1AB-BFE4-4D4D-ADBE-154CFD289A72}" type="datetimeFigureOut">
               <a:rPr lang="ko-KR" altLang="en-US" smtClean="0"/>
-              <a:t>2016-11-15</a:t>
+              <a:t>2016-12-15</a:t>
             </a:fld>
             <a:endParaRPr lang="ko-KR" altLang="en-US"/>
           </a:p>
@@ -2449,7 +2449,7 @@
           <a:p>
             <a:fld id="{0285A1AB-BFE4-4D4D-ADBE-154CFD289A72}" type="datetimeFigureOut">
               <a:rPr lang="ko-KR" altLang="en-US" smtClean="0"/>
-              <a:t>2016-11-15</a:t>
+              <a:t>2016-12-15</a:t>
             </a:fld>
             <a:endParaRPr lang="ko-KR" altLang="en-US"/>
           </a:p>
@@ -2701,7 +2701,7 @@
           <a:p>
             <a:fld id="{0285A1AB-BFE4-4D4D-ADBE-154CFD289A72}" type="datetimeFigureOut">
               <a:rPr lang="ko-KR" altLang="en-US" smtClean="0"/>
-              <a:t>2016-11-15</a:t>
+              <a:t>2016-12-15</a:t>
             </a:fld>
             <a:endParaRPr lang="ko-KR" altLang="en-US"/>
           </a:p>
@@ -2912,7 +2912,7 @@
           <a:p>
             <a:fld id="{0285A1AB-BFE4-4D4D-ADBE-154CFD289A72}" type="datetimeFigureOut">
               <a:rPr lang="ko-KR" altLang="en-US" smtClean="0"/>
-              <a:t>2016-11-15</a:t>
+              <a:t>2016-12-15</a:t>
             </a:fld>
             <a:endParaRPr lang="ko-KR" altLang="en-US"/>
           </a:p>
@@ -4329,14 +4329,14 @@
             <p:ph idx="1"/>
             <p:extLst>
               <p:ext uri="{D42A27DB-BD31-4B8C-83A1-F6EECF244321}">
-                <p14:modId xmlns:p14="http://schemas.microsoft.com/office/powerpoint/2010/main" val="4020916971"/>
+                <p14:modId xmlns:p14="http://schemas.microsoft.com/office/powerpoint/2010/main" val="3448797335"/>
               </p:ext>
             </p:extLst>
           </p:nvPr>
         </p:nvGraphicFramePr>
         <p:xfrm>
           <a:off x="838202" y="1000008"/>
-          <a:ext cx="10515602" cy="4653778"/>
+          <a:ext cx="10515602" cy="4974043"/>
         </p:xfrm>
         <a:graphic>
           <a:graphicData uri="http://schemas.openxmlformats.org/drawingml/2006/table">
@@ -4374,7 +4374,7 @@
                   </a:extLst>
                 </a:gridCol>
               </a:tblGrid>
-              <a:tr h="0">
+              <a:tr h="365760">
                 <a:tc>
                   <a:txBody>
                     <a:bodyPr/>
@@ -4437,7 +4437,7 @@
                   </a:ext>
                 </a:extLst>
               </a:tr>
-              <a:tr h="316357">
+              <a:tr h="480285">
                 <a:tc>
                   <a:txBody>
                     <a:bodyPr/>
@@ -4513,7 +4513,7 @@
                   </a:ext>
                 </a:extLst>
               </a:tr>
-              <a:tr h="316357">
+              <a:tr h="571500">
                 <a:tc>
                   <a:txBody>
                     <a:bodyPr/>
@@ -4641,7 +4641,7 @@
                       </a:r>
                       <a:r>
                         <a:rPr lang="en-US" altLang="ko-KR" sz="1050" dirty="0"/>
-                        <a:t>7</a:t>
+                        <a:t>30</a:t>
                       </a:r>
                       <a:r>
                         <a:rPr lang="ko-KR" altLang="en-US" sz="1050" dirty="0"/>
@@ -4770,7 +4770,7 @@
                   </a:ext>
                 </a:extLst>
               </a:tr>
-              <a:tr h="370840">
+              <a:tr h="640080">
                 <a:tc>
                   <a:txBody>
                     <a:bodyPr/>
@@ -4898,7 +4898,7 @@
                   </a:ext>
                 </a:extLst>
               </a:tr>
-              <a:tr h="370840">
+              <a:tr h="411480">
                 <a:tc>
                   <a:txBody>
                     <a:bodyPr/>
@@ -5002,7 +5002,7 @@
                   </a:ext>
                 </a:extLst>
               </a:tr>
-              <a:tr h="185420">
+              <a:tr h="411480">
                 <a:tc>
                   <a:txBody>
                     <a:bodyPr/>
@@ -5118,7 +5118,7 @@
                   </a:ext>
                 </a:extLst>
               </a:tr>
-              <a:tr h="185420">
+              <a:tr h="411480">
                 <a:tc>
                   <a:txBody>
                     <a:bodyPr/>
@@ -5198,6 +5198,36 @@
                       </a:r>
                       <a:endParaRPr lang="en-US" altLang="ko-KR" sz="1050" dirty="0"/>
                     </a:p>
+                    <a:p>
+                      <a:pPr marL="228600" indent="-228600" latinLnBrk="1">
+                        <a:buAutoNum type="arabicPeriod"/>
+                      </a:pPr>
+                      <a:r>
+                        <a:rPr lang="ko-KR" altLang="en-US" sz="1050" dirty="0"/>
+                        <a:t>공격용 방울 추가</a:t>
+                      </a:r>
+                      <a:r>
+                        <a:rPr lang="en-US" altLang="ko-KR" sz="1050" baseline="0" dirty="0"/>
+                        <a:t>(</a:t>
+                      </a:r>
+                      <a:r>
+                        <a:rPr lang="ko-KR" altLang="en-US" sz="1050" baseline="0" dirty="0"/>
+                        <a:t>물</a:t>
+                      </a:r>
+                      <a:r>
+                        <a:rPr lang="en-US" altLang="ko-KR" sz="1050" baseline="0" dirty="0"/>
+                        <a:t>, </a:t>
+                      </a:r>
+                      <a:r>
+                        <a:rPr lang="ko-KR" altLang="en-US" sz="1050" baseline="0" dirty="0"/>
+                        <a:t>전기</a:t>
+                      </a:r>
+                      <a:r>
+                        <a:rPr lang="en-US" altLang="ko-KR" sz="1050" baseline="0" dirty="0"/>
+                        <a:t>)</a:t>
+                      </a:r>
+                      <a:endParaRPr lang="en-US" altLang="ko-KR" sz="1050" dirty="0"/>
+                    </a:p>
                   </a:txBody>
                   <a:tcPr/>
                 </a:tc>
@@ -5207,7 +5237,7 @@
                   </a:ext>
                 </a:extLst>
               </a:tr>
-              <a:tr h="185420">
+              <a:tr h="571500">
                 <a:tc>
                   <a:txBody>
                     <a:bodyPr/>
@@ -5318,8 +5348,17 @@
                       </a:pPr>
                       <a:r>
                         <a:rPr lang="ko-KR" altLang="en-US" sz="1050" dirty="0"/>
-                        <a:t>애니메이션 구상</a:t>
-                      </a:r>
+                        <a:t>클리어 실패 시 계속 </a:t>
+                      </a:r>
+                      <a:r>
+                        <a:rPr lang="en-US" altLang="ko-KR" sz="1050" dirty="0"/>
+                        <a:t>continue </a:t>
+                      </a:r>
+                      <a:r>
+                        <a:rPr lang="ko-KR" altLang="en-US" sz="1050" dirty="0"/>
+                        <a:t>하도록 변경</a:t>
+                      </a:r>
+                      <a:endParaRPr lang="en-US" altLang="ko-KR" sz="1050" dirty="0"/>
                     </a:p>
                   </a:txBody>
                   <a:tcPr/>
@@ -5330,7 +5369,7 @@
                   </a:ext>
                 </a:extLst>
               </a:tr>
-              <a:tr h="185420">
+              <a:tr h="365760">
                 <a:tc>
                   <a:txBody>
                     <a:bodyPr/>
@@ -5424,53 +5463,7 @@
           <a:p>
             <a:r>
               <a:rPr lang="ko-KR" altLang="en-US" dirty="0"/>
-              <a:t>진행 상황</a:t>
-            </a:r>
-          </a:p>
-        </p:txBody>
-      </p:sp>
-      <p:sp>
-        <p:nvSpPr>
-          <p:cNvPr id="2" name="화살표: 오른쪽 1"/>
-          <p:cNvSpPr/>
-          <p:nvPr/>
-        </p:nvSpPr>
-        <p:spPr>
-          <a:xfrm>
-            <a:off x="139701" y="4629598"/>
-            <a:ext cx="863600" cy="863600"/>
-          </a:xfrm>
-          <a:prstGeom prst="rightArrow">
-            <a:avLst/>
-          </a:prstGeom>
-          <a:solidFill>
-            <a:srgbClr val="FF0000"/>
-          </a:solidFill>
-        </p:spPr>
-        <p:style>
-          <a:lnRef idx="2">
-            <a:schemeClr val="accent1">
-              <a:shade val="50000"/>
-            </a:schemeClr>
-          </a:lnRef>
-          <a:fillRef idx="1">
-            <a:schemeClr val="accent1"/>
-          </a:fillRef>
-          <a:effectRef idx="0">
-            <a:schemeClr val="accent1"/>
-          </a:effectRef>
-          <a:fontRef idx="minor">
-            <a:schemeClr val="lt1"/>
-          </a:fontRef>
-        </p:style>
-        <p:txBody>
-          <a:bodyPr rtlCol="0" anchor="ctr"/>
-          <a:lstStyle/>
-          <a:p>
-            <a:pPr algn="ctr"/>
-            <a:r>
-              <a:rPr lang="ko-KR" altLang="en-US" sz="1200" dirty="0"/>
-              <a:t>진행중</a:t>
+              <a:t>계획대비 결과</a:t>
             </a:r>
           </a:p>
         </p:txBody>

</xml_diff>